<commit_message>
Added scan code for Feedback
</commit_message>
<xml_diff>
--- a/Meetup_29_June_2019/Praveen_ML_Net_Shared.pptx
+++ b/Meetup_29_June_2019/Praveen_ML_Net_Shared.pptx
@@ -6432,7 +6432,7 @@
           <a:noFill/>
           <a:extLst>
             <a:ext uri="{909E8E84-426E-40dd-AFC4-6F175D3DCCD1}">
-              <a14:hiddenFill xmlns:a14="http://schemas.microsoft.com/office/drawing/2010/main" xmlns="">
+              <a14:hiddenFill xmlns="" xmlns:a14="http://schemas.microsoft.com/office/drawing/2010/main">
                 <a:solidFill>
                   <a:srgbClr val="FFFFFF"/>
                 </a:solidFill>
@@ -6491,7 +6491,7 @@
             </a:ln>
             <a:extLst>
               <a:ext uri="{91240B29-F687-4f45-9708-019B960494DF}">
-                <a14:hiddenLine xmlns:a14="http://schemas.microsoft.com/office/drawing/2010/main" xmlns="" w="9525">
+                <a14:hiddenLine xmlns="" xmlns:a14="http://schemas.microsoft.com/office/drawing/2010/main" w="9525">
                   <a:solidFill>
                     <a:srgbClr val="000000"/>
                   </a:solidFill>
@@ -6581,7 +6581,7 @@
             </a:ln>
             <a:extLst>
               <a:ext uri="{91240B29-F687-4f45-9708-019B960494DF}">
-                <a14:hiddenLine xmlns:a14="http://schemas.microsoft.com/office/drawing/2010/main" xmlns="" w="9525">
+                <a14:hiddenLine xmlns="" xmlns:a14="http://schemas.microsoft.com/office/drawing/2010/main" w="9525">
                   <a:solidFill>
                     <a:srgbClr val="000000"/>
                   </a:solidFill>
@@ -6671,7 +6671,7 @@
             </a:ln>
             <a:extLst>
               <a:ext uri="{91240B29-F687-4f45-9708-019B960494DF}">
-                <a14:hiddenLine xmlns:a14="http://schemas.microsoft.com/office/drawing/2010/main" xmlns="" w="9525">
+                <a14:hiddenLine xmlns="" xmlns:a14="http://schemas.microsoft.com/office/drawing/2010/main" w="9525">
                   <a:solidFill>
                     <a:srgbClr val="000000"/>
                   </a:solidFill>
@@ -6705,7 +6705,7 @@
             </a:ln>
             <a:extLst>
               <a:ext uri="{91240B29-F687-4f45-9708-019B960494DF}">
-                <a14:hiddenLine xmlns:a14="http://schemas.microsoft.com/office/drawing/2010/main" xmlns="" w="9525">
+                <a14:hiddenLine xmlns="" xmlns:a14="http://schemas.microsoft.com/office/drawing/2010/main" w="9525">
                   <a:solidFill>
                     <a:srgbClr val="000000"/>
                   </a:solidFill>
@@ -6795,7 +6795,7 @@
             </a:ln>
             <a:extLst>
               <a:ext uri="{91240B29-F687-4f45-9708-019B960494DF}">
-                <a14:hiddenLine xmlns:a14="http://schemas.microsoft.com/office/drawing/2010/main" xmlns="" w="9525">
+                <a14:hiddenLine xmlns="" xmlns:a14="http://schemas.microsoft.com/office/drawing/2010/main" w="9525">
                   <a:solidFill>
                     <a:srgbClr val="000000"/>
                   </a:solidFill>
@@ -6857,7 +6857,7 @@
             </a:ln>
             <a:extLst>
               <a:ext uri="{91240B29-F687-4f45-9708-019B960494DF}">
-                <a14:hiddenLine xmlns:a14="http://schemas.microsoft.com/office/drawing/2010/main" xmlns="" w="9525">
+                <a14:hiddenLine xmlns="" xmlns:a14="http://schemas.microsoft.com/office/drawing/2010/main" w="9525">
                   <a:solidFill>
                     <a:srgbClr val="000000"/>
                   </a:solidFill>
@@ -6919,7 +6919,7 @@
             </a:ln>
             <a:extLst>
               <a:ext uri="{91240B29-F687-4f45-9708-019B960494DF}">
-                <a14:hiddenLine xmlns:a14="http://schemas.microsoft.com/office/drawing/2010/main" xmlns="" w="9525">
+                <a14:hiddenLine xmlns="" xmlns:a14="http://schemas.microsoft.com/office/drawing/2010/main" w="9525">
                   <a:solidFill>
                     <a:srgbClr val="000000"/>
                   </a:solidFill>
@@ -7009,7 +7009,7 @@
             </a:ln>
             <a:extLst>
               <a:ext uri="{91240B29-F687-4f45-9708-019B960494DF}">
-                <a14:hiddenLine xmlns:a14="http://schemas.microsoft.com/office/drawing/2010/main" xmlns="" w="9525">
+                <a14:hiddenLine xmlns="" xmlns:a14="http://schemas.microsoft.com/office/drawing/2010/main" w="9525">
                   <a:solidFill>
                     <a:srgbClr val="000000"/>
                   </a:solidFill>
@@ -7071,7 +7071,7 @@
             </a:ln>
             <a:extLst>
               <a:ext uri="{91240B29-F687-4f45-9708-019B960494DF}">
-                <a14:hiddenLine xmlns:a14="http://schemas.microsoft.com/office/drawing/2010/main" xmlns="" w="9525">
+                <a14:hiddenLine xmlns="" xmlns:a14="http://schemas.microsoft.com/office/drawing/2010/main" w="9525">
                   <a:solidFill>
                     <a:srgbClr val="000000"/>
                   </a:solidFill>
@@ -7133,7 +7133,7 @@
             </a:ln>
             <a:extLst>
               <a:ext uri="{91240B29-F687-4f45-9708-019B960494DF}">
-                <a14:hiddenLine xmlns:a14="http://schemas.microsoft.com/office/drawing/2010/main" xmlns="" w="9525">
+                <a14:hiddenLine xmlns="" xmlns:a14="http://schemas.microsoft.com/office/drawing/2010/main" w="9525">
                   <a:solidFill>
                     <a:srgbClr val="000000"/>
                   </a:solidFill>
@@ -7223,7 +7223,7 @@
             </a:ln>
             <a:extLst>
               <a:ext uri="{91240B29-F687-4f45-9708-019B960494DF}">
-                <a14:hiddenLine xmlns:a14="http://schemas.microsoft.com/office/drawing/2010/main" xmlns="" w="9525">
+                <a14:hiddenLine xmlns="" xmlns:a14="http://schemas.microsoft.com/office/drawing/2010/main" w="9525">
                   <a:solidFill>
                     <a:srgbClr val="000000"/>
                   </a:solidFill>
@@ -7313,7 +7313,7 @@
             </a:ln>
             <a:extLst>
               <a:ext uri="{91240B29-F687-4f45-9708-019B960494DF}">
-                <a14:hiddenLine xmlns:a14="http://schemas.microsoft.com/office/drawing/2010/main" xmlns="" w="9525">
+                <a14:hiddenLine xmlns="" xmlns:a14="http://schemas.microsoft.com/office/drawing/2010/main" w="9525">
                   <a:solidFill>
                     <a:srgbClr val="000000"/>
                   </a:solidFill>
@@ -7375,7 +7375,7 @@
             </a:ln>
             <a:extLst>
               <a:ext uri="{91240B29-F687-4f45-9708-019B960494DF}">
-                <a14:hiddenLine xmlns:a14="http://schemas.microsoft.com/office/drawing/2010/main" xmlns="" w="9525">
+                <a14:hiddenLine xmlns="" xmlns:a14="http://schemas.microsoft.com/office/drawing/2010/main" w="9525">
                   <a:solidFill>
                     <a:srgbClr val="000000"/>
                   </a:solidFill>
@@ -7485,7 +7485,7 @@
             </a:ln>
             <a:extLst>
               <a:ext uri="{91240B29-F687-4f45-9708-019B960494DF}">
-                <a14:hiddenLine xmlns:a14="http://schemas.microsoft.com/office/drawing/2010/main" xmlns="" w="9525">
+                <a14:hiddenLine xmlns="" xmlns:a14="http://schemas.microsoft.com/office/drawing/2010/main" w="9525">
                   <a:solidFill>
                     <a:srgbClr val="000000"/>
                   </a:solidFill>
@@ -7547,7 +7547,7 @@
             </a:ln>
             <a:extLst>
               <a:ext uri="{91240B29-F687-4f45-9708-019B960494DF}">
-                <a14:hiddenLine xmlns:a14="http://schemas.microsoft.com/office/drawing/2010/main" xmlns="" w="9525">
+                <a14:hiddenLine xmlns="" xmlns:a14="http://schemas.microsoft.com/office/drawing/2010/main" w="9525">
                   <a:solidFill>
                     <a:srgbClr val="000000"/>
                   </a:solidFill>
@@ -7637,7 +7637,7 @@
             </a:ln>
             <a:extLst>
               <a:ext uri="{91240B29-F687-4f45-9708-019B960494DF}">
-                <a14:hiddenLine xmlns:a14="http://schemas.microsoft.com/office/drawing/2010/main" xmlns="" w="9525">
+                <a14:hiddenLine xmlns="" xmlns:a14="http://schemas.microsoft.com/office/drawing/2010/main" w="9525">
                   <a:solidFill>
                     <a:srgbClr val="000000"/>
                   </a:solidFill>
@@ -7727,7 +7727,7 @@
             </a:ln>
             <a:extLst>
               <a:ext uri="{91240B29-F687-4f45-9708-019B960494DF}">
-                <a14:hiddenLine xmlns:a14="http://schemas.microsoft.com/office/drawing/2010/main" xmlns="" w="9525">
+                <a14:hiddenLine xmlns="" xmlns:a14="http://schemas.microsoft.com/office/drawing/2010/main" w="9525">
                   <a:solidFill>
                     <a:srgbClr val="000000"/>
                   </a:solidFill>
@@ -7789,7 +7789,7 @@
             </a:ln>
             <a:extLst>
               <a:ext uri="{91240B29-F687-4f45-9708-019B960494DF}">
-                <a14:hiddenLine xmlns:a14="http://schemas.microsoft.com/office/drawing/2010/main" xmlns="" w="9525">
+                <a14:hiddenLine xmlns="" xmlns:a14="http://schemas.microsoft.com/office/drawing/2010/main" w="9525">
                   <a:solidFill>
                     <a:srgbClr val="000000"/>
                   </a:solidFill>
@@ -7879,7 +7879,7 @@
             </a:ln>
             <a:extLst>
               <a:ext uri="{91240B29-F687-4f45-9708-019B960494DF}">
-                <a14:hiddenLine xmlns:a14="http://schemas.microsoft.com/office/drawing/2010/main" xmlns="" w="9525">
+                <a14:hiddenLine xmlns="" xmlns:a14="http://schemas.microsoft.com/office/drawing/2010/main" w="9525">
                   <a:solidFill>
                     <a:srgbClr val="000000"/>
                   </a:solidFill>
@@ -7969,7 +7969,7 @@
             </a:ln>
             <a:extLst>
               <a:ext uri="{91240B29-F687-4f45-9708-019B960494DF}">
-                <a14:hiddenLine xmlns:a14="http://schemas.microsoft.com/office/drawing/2010/main" xmlns="" w="9525">
+                <a14:hiddenLine xmlns="" xmlns:a14="http://schemas.microsoft.com/office/drawing/2010/main" w="9525">
                   <a:solidFill>
                     <a:srgbClr val="000000"/>
                   </a:solidFill>
@@ -8025,7 +8025,7 @@
             </a:ln>
             <a:extLst>
               <a:ext uri="{91240B29-F687-4f45-9708-019B960494DF}">
-                <a14:hiddenLine xmlns:a14="http://schemas.microsoft.com/office/drawing/2010/main" xmlns="" w="9525">
+                <a14:hiddenLine xmlns="" xmlns:a14="http://schemas.microsoft.com/office/drawing/2010/main" w="9525">
                   <a:solidFill>
                     <a:srgbClr val="000000"/>
                   </a:solidFill>
@@ -8115,7 +8115,7 @@
             </a:ln>
             <a:extLst>
               <a:ext uri="{91240B29-F687-4f45-9708-019B960494DF}">
-                <a14:hiddenLine xmlns:a14="http://schemas.microsoft.com/office/drawing/2010/main" xmlns="" w="9525">
+                <a14:hiddenLine xmlns="" xmlns:a14="http://schemas.microsoft.com/office/drawing/2010/main" w="9525">
                   <a:solidFill>
                     <a:srgbClr val="000000"/>
                   </a:solidFill>
@@ -8171,7 +8171,7 @@
             </a:ln>
             <a:extLst>
               <a:ext uri="{91240B29-F687-4f45-9708-019B960494DF}">
-                <a14:hiddenLine xmlns:a14="http://schemas.microsoft.com/office/drawing/2010/main" xmlns="" w="9525">
+                <a14:hiddenLine xmlns="" xmlns:a14="http://schemas.microsoft.com/office/drawing/2010/main" w="9525">
                   <a:solidFill>
                     <a:srgbClr val="000000"/>
                   </a:solidFill>
@@ -8261,7 +8261,7 @@
             </a:ln>
             <a:extLst>
               <a:ext uri="{91240B29-F687-4f45-9708-019B960494DF}">
-                <a14:hiddenLine xmlns:a14="http://schemas.microsoft.com/office/drawing/2010/main" xmlns="" w="9525">
+                <a14:hiddenLine xmlns="" xmlns:a14="http://schemas.microsoft.com/office/drawing/2010/main" w="9525">
                   <a:solidFill>
                     <a:srgbClr val="000000"/>
                   </a:solidFill>
@@ -8329,7 +8329,7 @@
             </a:ln>
             <a:extLst>
               <a:ext uri="{91240B29-F687-4f45-9708-019B960494DF}">
-                <a14:hiddenLine xmlns:a14="http://schemas.microsoft.com/office/drawing/2010/main" xmlns="" w="9525">
+                <a14:hiddenLine xmlns="" xmlns:a14="http://schemas.microsoft.com/office/drawing/2010/main" w="9525">
                   <a:solidFill>
                     <a:srgbClr val="000000"/>
                   </a:solidFill>
@@ -8419,7 +8419,7 @@
             </a:ln>
             <a:extLst>
               <a:ext uri="{91240B29-F687-4f45-9708-019B960494DF}">
-                <a14:hiddenLine xmlns:a14="http://schemas.microsoft.com/office/drawing/2010/main" xmlns="" w="9525">
+                <a14:hiddenLine xmlns="" xmlns:a14="http://schemas.microsoft.com/office/drawing/2010/main" w="9525">
                   <a:solidFill>
                     <a:srgbClr val="000000"/>
                   </a:solidFill>
@@ -8487,7 +8487,7 @@
             </a:ln>
             <a:extLst>
               <a:ext uri="{91240B29-F687-4f45-9708-019B960494DF}">
-                <a14:hiddenLine xmlns:a14="http://schemas.microsoft.com/office/drawing/2010/main" xmlns="" w="9525">
+                <a14:hiddenLine xmlns="" xmlns:a14="http://schemas.microsoft.com/office/drawing/2010/main" w="9525">
                   <a:solidFill>
                     <a:srgbClr val="000000"/>
                   </a:solidFill>
@@ -8577,7 +8577,7 @@
             </a:ln>
             <a:extLst>
               <a:ext uri="{91240B29-F687-4f45-9708-019B960494DF}">
-                <a14:hiddenLine xmlns:a14="http://schemas.microsoft.com/office/drawing/2010/main" xmlns="" w="9525">
+                <a14:hiddenLine xmlns="" xmlns:a14="http://schemas.microsoft.com/office/drawing/2010/main" w="9525">
                   <a:solidFill>
                     <a:srgbClr val="000000"/>
                   </a:solidFill>
@@ -8611,7 +8611,7 @@
             </a:ln>
             <a:extLst>
               <a:ext uri="{91240B29-F687-4f45-9708-019B960494DF}">
-                <a14:hiddenLine xmlns:a14="http://schemas.microsoft.com/office/drawing/2010/main" xmlns="" w="9525">
+                <a14:hiddenLine xmlns="" xmlns:a14="http://schemas.microsoft.com/office/drawing/2010/main" w="9525">
                   <a:solidFill>
                     <a:srgbClr val="000000"/>
                   </a:solidFill>
@@ -8701,7 +8701,7 @@
             </a:ln>
             <a:extLst>
               <a:ext uri="{91240B29-F687-4f45-9708-019B960494DF}">
-                <a14:hiddenLine xmlns:a14="http://schemas.microsoft.com/office/drawing/2010/main" xmlns="" w="9525">
+                <a14:hiddenLine xmlns="" xmlns:a14="http://schemas.microsoft.com/office/drawing/2010/main" w="9525">
                   <a:solidFill>
                     <a:srgbClr val="000000"/>
                   </a:solidFill>
@@ -8763,7 +8763,7 @@
             </a:ln>
             <a:extLst>
               <a:ext uri="{91240B29-F687-4f45-9708-019B960494DF}">
-                <a14:hiddenLine xmlns:a14="http://schemas.microsoft.com/office/drawing/2010/main" xmlns="" w="9525">
+                <a14:hiddenLine xmlns="" xmlns:a14="http://schemas.microsoft.com/office/drawing/2010/main" w="9525">
                   <a:solidFill>
                     <a:srgbClr val="000000"/>
                   </a:solidFill>
@@ -8825,7 +8825,7 @@
             </a:ln>
             <a:extLst>
               <a:ext uri="{91240B29-F687-4f45-9708-019B960494DF}">
-                <a14:hiddenLine xmlns:a14="http://schemas.microsoft.com/office/drawing/2010/main" xmlns="" w="9525">
+                <a14:hiddenLine xmlns="" xmlns:a14="http://schemas.microsoft.com/office/drawing/2010/main" w="9525">
                   <a:solidFill>
                     <a:srgbClr val="000000"/>
                   </a:solidFill>
@@ -8915,7 +8915,7 @@
             </a:ln>
             <a:extLst>
               <a:ext uri="{91240B29-F687-4f45-9708-019B960494DF}">
-                <a14:hiddenLine xmlns:a14="http://schemas.microsoft.com/office/drawing/2010/main" xmlns="" w="9525">
+                <a14:hiddenLine xmlns="" xmlns:a14="http://schemas.microsoft.com/office/drawing/2010/main" w="9525">
                   <a:solidFill>
                     <a:srgbClr val="000000"/>
                   </a:solidFill>
@@ -8983,7 +8983,7 @@
             </a:ln>
             <a:extLst>
               <a:ext uri="{91240B29-F687-4f45-9708-019B960494DF}">
-                <a14:hiddenLine xmlns:a14="http://schemas.microsoft.com/office/drawing/2010/main" xmlns="" w="9525">
+                <a14:hiddenLine xmlns="" xmlns:a14="http://schemas.microsoft.com/office/drawing/2010/main" w="9525">
                   <a:solidFill>
                     <a:srgbClr val="000000"/>
                   </a:solidFill>
@@ -9045,7 +9045,7 @@
             </a:ln>
             <a:extLst>
               <a:ext uri="{91240B29-F687-4f45-9708-019B960494DF}">
-                <a14:hiddenLine xmlns:a14="http://schemas.microsoft.com/office/drawing/2010/main" xmlns="" w="9525">
+                <a14:hiddenLine xmlns="" xmlns:a14="http://schemas.microsoft.com/office/drawing/2010/main" w="9525">
                   <a:solidFill>
                     <a:srgbClr val="000000"/>
                   </a:solidFill>
@@ -9135,7 +9135,7 @@
             </a:ln>
             <a:extLst>
               <a:ext uri="{91240B29-F687-4f45-9708-019B960494DF}">
-                <a14:hiddenLine xmlns:a14="http://schemas.microsoft.com/office/drawing/2010/main" xmlns="" w="9525">
+                <a14:hiddenLine xmlns="" xmlns:a14="http://schemas.microsoft.com/office/drawing/2010/main" w="9525">
                   <a:solidFill>
                     <a:srgbClr val="000000"/>
                   </a:solidFill>
@@ -9197,7 +9197,7 @@
             </a:ln>
             <a:extLst>
               <a:ext uri="{91240B29-F687-4f45-9708-019B960494DF}">
-                <a14:hiddenLine xmlns:a14="http://schemas.microsoft.com/office/drawing/2010/main" xmlns="" w="9525">
+                <a14:hiddenLine xmlns="" xmlns:a14="http://schemas.microsoft.com/office/drawing/2010/main" w="9525">
                   <a:solidFill>
                     <a:srgbClr val="000000"/>
                   </a:solidFill>
@@ -9287,7 +9287,7 @@
             </a:ln>
             <a:extLst>
               <a:ext uri="{91240B29-F687-4f45-9708-019B960494DF}">
-                <a14:hiddenLine xmlns:a14="http://schemas.microsoft.com/office/drawing/2010/main" xmlns="" w="9525">
+                <a14:hiddenLine xmlns="" xmlns:a14="http://schemas.microsoft.com/office/drawing/2010/main" w="9525">
                   <a:solidFill>
                     <a:srgbClr val="000000"/>
                   </a:solidFill>
@@ -9349,7 +9349,7 @@
             </a:ln>
             <a:extLst>
               <a:ext uri="{91240B29-F687-4f45-9708-019B960494DF}">
-                <a14:hiddenLine xmlns:a14="http://schemas.microsoft.com/office/drawing/2010/main" xmlns="" w="9525">
+                <a14:hiddenLine xmlns="" xmlns:a14="http://schemas.microsoft.com/office/drawing/2010/main" w="9525">
                   <a:solidFill>
                     <a:srgbClr val="000000"/>
                   </a:solidFill>
@@ -9439,7 +9439,7 @@
             </a:ln>
             <a:extLst>
               <a:ext uri="{91240B29-F687-4f45-9708-019B960494DF}">
-                <a14:hiddenLine xmlns:a14="http://schemas.microsoft.com/office/drawing/2010/main" xmlns="" w="9525">
+                <a14:hiddenLine xmlns="" xmlns:a14="http://schemas.microsoft.com/office/drawing/2010/main" w="9525">
                   <a:solidFill>
                     <a:srgbClr val="000000"/>
                   </a:solidFill>
@@ -9473,7 +9473,7 @@
             </a:ln>
             <a:extLst>
               <a:ext uri="{91240B29-F687-4f45-9708-019B960494DF}">
-                <a14:hiddenLine xmlns:a14="http://schemas.microsoft.com/office/drawing/2010/main" xmlns="" w="9525">
+                <a14:hiddenLine xmlns="" xmlns:a14="http://schemas.microsoft.com/office/drawing/2010/main" w="9525">
                   <a:solidFill>
                     <a:srgbClr val="000000"/>
                   </a:solidFill>
@@ -9538,7 +9538,7 @@
             </a:ln>
             <a:extLst>
               <a:ext uri="{91240B29-F687-4f45-9708-019B960494DF}">
-                <a14:hiddenLine xmlns:a14="http://schemas.microsoft.com/office/drawing/2010/main" xmlns="" w="9525">
+                <a14:hiddenLine xmlns="" xmlns:a14="http://schemas.microsoft.com/office/drawing/2010/main" w="9525">
                   <a:solidFill>
                     <a:srgbClr val="000000"/>
                   </a:solidFill>
@@ -9628,7 +9628,7 @@
             </a:ln>
             <a:extLst>
               <a:ext uri="{91240B29-F687-4f45-9708-019B960494DF}">
-                <a14:hiddenLine xmlns:a14="http://schemas.microsoft.com/office/drawing/2010/main" xmlns="" w="9525">
+                <a14:hiddenLine xmlns="" xmlns:a14="http://schemas.microsoft.com/office/drawing/2010/main" w="9525">
                   <a:solidFill>
                     <a:srgbClr val="000000"/>
                   </a:solidFill>
@@ -9690,7 +9690,7 @@
             </a:ln>
             <a:extLst>
               <a:ext uri="{91240B29-F687-4f45-9708-019B960494DF}">
-                <a14:hiddenLine xmlns:a14="http://schemas.microsoft.com/office/drawing/2010/main" xmlns="" w="9525">
+                <a14:hiddenLine xmlns="" xmlns:a14="http://schemas.microsoft.com/office/drawing/2010/main" w="9525">
                   <a:solidFill>
                     <a:srgbClr val="000000"/>
                   </a:solidFill>
@@ -9780,7 +9780,7 @@
             </a:ln>
             <a:extLst>
               <a:ext uri="{91240B29-F687-4f45-9708-019B960494DF}">
-                <a14:hiddenLine xmlns:a14="http://schemas.microsoft.com/office/drawing/2010/main" xmlns="" w="9525">
+                <a14:hiddenLine xmlns="" xmlns:a14="http://schemas.microsoft.com/office/drawing/2010/main" w="9525">
                   <a:solidFill>
                     <a:srgbClr val="000000"/>
                   </a:solidFill>
@@ -9870,7 +9870,7 @@
             </a:ln>
             <a:extLst>
               <a:ext uri="{91240B29-F687-4f45-9708-019B960494DF}">
-                <a14:hiddenLine xmlns:a14="http://schemas.microsoft.com/office/drawing/2010/main" xmlns="" w="9525">
+                <a14:hiddenLine xmlns="" xmlns:a14="http://schemas.microsoft.com/office/drawing/2010/main" w="9525">
                   <a:solidFill>
                     <a:srgbClr val="000000"/>
                   </a:solidFill>
@@ -9935,7 +9935,7 @@
             </a:ln>
             <a:extLst>
               <a:ext uri="{91240B29-F687-4f45-9708-019B960494DF}">
-                <a14:hiddenLine xmlns:a14="http://schemas.microsoft.com/office/drawing/2010/main" xmlns="" w="9525">
+                <a14:hiddenLine xmlns="" xmlns:a14="http://schemas.microsoft.com/office/drawing/2010/main" w="9525">
                   <a:solidFill>
                     <a:srgbClr val="000000"/>
                   </a:solidFill>
@@ -9997,7 +9997,7 @@
             </a:ln>
             <a:extLst>
               <a:ext uri="{91240B29-F687-4f45-9708-019B960494DF}">
-                <a14:hiddenLine xmlns:a14="http://schemas.microsoft.com/office/drawing/2010/main" xmlns="" w="9525">
+                <a14:hiddenLine xmlns="" xmlns:a14="http://schemas.microsoft.com/office/drawing/2010/main" w="9525">
                   <a:solidFill>
                     <a:srgbClr val="000000"/>
                   </a:solidFill>
@@ -10087,7 +10087,7 @@
             </a:ln>
             <a:extLst>
               <a:ext uri="{91240B29-F687-4f45-9708-019B960494DF}">
-                <a14:hiddenLine xmlns:a14="http://schemas.microsoft.com/office/drawing/2010/main" xmlns="" w="9525">
+                <a14:hiddenLine xmlns="" xmlns:a14="http://schemas.microsoft.com/office/drawing/2010/main" w="9525">
                   <a:solidFill>
                     <a:srgbClr val="000000"/>
                   </a:solidFill>
@@ -10177,7 +10177,7 @@
             </a:ln>
             <a:extLst>
               <a:ext uri="{91240B29-F687-4f45-9708-019B960494DF}">
-                <a14:hiddenLine xmlns:a14="http://schemas.microsoft.com/office/drawing/2010/main" xmlns="" w="9525">
+                <a14:hiddenLine xmlns="" xmlns:a14="http://schemas.microsoft.com/office/drawing/2010/main" w="9525">
                   <a:solidFill>
                     <a:srgbClr val="000000"/>
                   </a:solidFill>
@@ -10239,7 +10239,7 @@
             </a:ln>
             <a:extLst>
               <a:ext uri="{91240B29-F687-4f45-9708-019B960494DF}">
-                <a14:hiddenLine xmlns:a14="http://schemas.microsoft.com/office/drawing/2010/main" xmlns="" w="9525">
+                <a14:hiddenLine xmlns="" xmlns:a14="http://schemas.microsoft.com/office/drawing/2010/main" w="9525">
                   <a:solidFill>
                     <a:srgbClr val="000000"/>
                   </a:solidFill>
@@ -10359,7 +10359,7 @@
             </a:ln>
             <a:extLst>
               <a:ext uri="{91240B29-F687-4f45-9708-019B960494DF}">
-                <a14:hiddenLine xmlns:a14="http://schemas.microsoft.com/office/drawing/2010/main" xmlns="" w="9525">
+                <a14:hiddenLine xmlns="" xmlns:a14="http://schemas.microsoft.com/office/drawing/2010/main" w="9525">
                   <a:solidFill>
                     <a:srgbClr val="000000"/>
                   </a:solidFill>
@@ -10427,7 +10427,7 @@
             </a:ln>
             <a:extLst>
               <a:ext uri="{91240B29-F687-4f45-9708-019B960494DF}">
-                <a14:hiddenLine xmlns:a14="http://schemas.microsoft.com/office/drawing/2010/main" xmlns="" w="9525">
+                <a14:hiddenLine xmlns="" xmlns:a14="http://schemas.microsoft.com/office/drawing/2010/main" w="9525">
                   <a:solidFill>
                     <a:srgbClr val="000000"/>
                   </a:solidFill>
@@ -10517,7 +10517,7 @@
             </a:ln>
             <a:extLst>
               <a:ext uri="{91240B29-F687-4f45-9708-019B960494DF}">
-                <a14:hiddenLine xmlns:a14="http://schemas.microsoft.com/office/drawing/2010/main" xmlns="" w="9525">
+                <a14:hiddenLine xmlns="" xmlns:a14="http://schemas.microsoft.com/office/drawing/2010/main" w="9525">
                   <a:solidFill>
                     <a:srgbClr val="000000"/>
                   </a:solidFill>
@@ -15246,7 +15246,7 @@
           <a:noFill/>
           <a:extLst>
             <a:ext uri="{909E8E84-426E-40dd-AFC4-6F175D3DCCD1}">
-              <a14:hiddenFill xmlns:a14="http://schemas.microsoft.com/office/drawing/2010/main" xmlns="">
+              <a14:hiddenFill xmlns="" xmlns:a14="http://schemas.microsoft.com/office/drawing/2010/main">
                 <a:solidFill>
                   <a:srgbClr val="FFFFFF"/>
                 </a:solidFill>
@@ -15320,7 +15320,7 @@
               </a:ln>
               <a:extLst>
                 <a:ext uri="{91240B29-F687-4f45-9708-019B960494DF}">
-                  <a14:hiddenLine xmlns:a14="http://schemas.microsoft.com/office/drawing/2010/main" xmlns="" w="9525">
+                  <a14:hiddenLine xmlns="" xmlns:a14="http://schemas.microsoft.com/office/drawing/2010/main" w="9525">
                     <a:solidFill>
                       <a:srgbClr val="000000"/>
                     </a:solidFill>
@@ -15410,7 +15410,7 @@
               </a:ln>
               <a:extLst>
                 <a:ext uri="{91240B29-F687-4f45-9708-019B960494DF}">
-                  <a14:hiddenLine xmlns:a14="http://schemas.microsoft.com/office/drawing/2010/main" xmlns="" w="9525">
+                  <a14:hiddenLine xmlns="" xmlns:a14="http://schemas.microsoft.com/office/drawing/2010/main" w="9525">
                     <a:solidFill>
                       <a:srgbClr val="000000"/>
                     </a:solidFill>
@@ -15500,7 +15500,7 @@
               </a:ln>
               <a:extLst>
                 <a:ext uri="{91240B29-F687-4f45-9708-019B960494DF}">
-                  <a14:hiddenLine xmlns:a14="http://schemas.microsoft.com/office/drawing/2010/main" xmlns="" w="9525">
+                  <a14:hiddenLine xmlns="" xmlns:a14="http://schemas.microsoft.com/office/drawing/2010/main" w="9525">
                     <a:solidFill>
                       <a:srgbClr val="000000"/>
                     </a:solidFill>
@@ -15562,7 +15562,7 @@
               </a:ln>
               <a:extLst>
                 <a:ext uri="{91240B29-F687-4f45-9708-019B960494DF}">
-                  <a14:hiddenLine xmlns:a14="http://schemas.microsoft.com/office/drawing/2010/main" xmlns="" w="9525">
+                  <a14:hiddenLine xmlns="" xmlns:a14="http://schemas.microsoft.com/office/drawing/2010/main" w="9525">
                     <a:solidFill>
                       <a:srgbClr val="000000"/>
                     </a:solidFill>
@@ -15652,7 +15652,7 @@
               </a:ln>
               <a:extLst>
                 <a:ext uri="{91240B29-F687-4f45-9708-019B960494DF}">
-                  <a14:hiddenLine xmlns:a14="http://schemas.microsoft.com/office/drawing/2010/main" xmlns="" w="9525">
+                  <a14:hiddenLine xmlns="" xmlns:a14="http://schemas.microsoft.com/office/drawing/2010/main" w="9525">
                     <a:solidFill>
                       <a:srgbClr val="000000"/>
                     </a:solidFill>
@@ -15714,7 +15714,7 @@
               </a:ln>
               <a:extLst>
                 <a:ext uri="{91240B29-F687-4f45-9708-019B960494DF}">
-                  <a14:hiddenLine xmlns:a14="http://schemas.microsoft.com/office/drawing/2010/main" xmlns="" w="9525">
+                  <a14:hiddenLine xmlns="" xmlns:a14="http://schemas.microsoft.com/office/drawing/2010/main" w="9525">
                     <a:solidFill>
                       <a:srgbClr val="000000"/>
                     </a:solidFill>
@@ -15776,7 +15776,7 @@
               </a:ln>
               <a:extLst>
                 <a:ext uri="{91240B29-F687-4f45-9708-019B960494DF}">
-                  <a14:hiddenLine xmlns:a14="http://schemas.microsoft.com/office/drawing/2010/main" xmlns="" w="9525">
+                  <a14:hiddenLine xmlns="" xmlns:a14="http://schemas.microsoft.com/office/drawing/2010/main" w="9525">
                     <a:solidFill>
                       <a:srgbClr val="000000"/>
                     </a:solidFill>
@@ -15866,7 +15866,7 @@
               </a:ln>
               <a:extLst>
                 <a:ext uri="{91240B29-F687-4f45-9708-019B960494DF}">
-                  <a14:hiddenLine xmlns:a14="http://schemas.microsoft.com/office/drawing/2010/main" xmlns="" w="9525">
+                  <a14:hiddenLine xmlns="" xmlns:a14="http://schemas.microsoft.com/office/drawing/2010/main" w="9525">
                     <a:solidFill>
                       <a:srgbClr val="000000"/>
                     </a:solidFill>
@@ -15956,7 +15956,7 @@
               </a:ln>
               <a:extLst>
                 <a:ext uri="{91240B29-F687-4f45-9708-019B960494DF}">
-                  <a14:hiddenLine xmlns:a14="http://schemas.microsoft.com/office/drawing/2010/main" xmlns="" w="9525">
+                  <a14:hiddenLine xmlns="" xmlns:a14="http://schemas.microsoft.com/office/drawing/2010/main" w="9525">
                     <a:solidFill>
                       <a:srgbClr val="000000"/>
                     </a:solidFill>
@@ -16018,7 +16018,7 @@
               </a:ln>
               <a:extLst>
                 <a:ext uri="{91240B29-F687-4f45-9708-019B960494DF}">
-                  <a14:hiddenLine xmlns:a14="http://schemas.microsoft.com/office/drawing/2010/main" xmlns="" w="9525">
+                  <a14:hiddenLine xmlns="" xmlns:a14="http://schemas.microsoft.com/office/drawing/2010/main" w="9525">
                     <a:solidFill>
                       <a:srgbClr val="000000"/>
                     </a:solidFill>
@@ -16128,7 +16128,7 @@
               </a:ln>
               <a:extLst>
                 <a:ext uri="{91240B29-F687-4f45-9708-019B960494DF}">
-                  <a14:hiddenLine xmlns:a14="http://schemas.microsoft.com/office/drawing/2010/main" xmlns="" w="9525">
+                  <a14:hiddenLine xmlns="" xmlns:a14="http://schemas.microsoft.com/office/drawing/2010/main" w="9525">
                     <a:solidFill>
                       <a:srgbClr val="000000"/>
                     </a:solidFill>
@@ -16212,7 +16212,7 @@
               </a:ln>
               <a:extLst>
                 <a:ext uri="{91240B29-F687-4f45-9708-019B960494DF}">
-                  <a14:hiddenLine xmlns:a14="http://schemas.microsoft.com/office/drawing/2010/main" xmlns="" w="9525">
+                  <a14:hiddenLine xmlns="" xmlns:a14="http://schemas.microsoft.com/office/drawing/2010/main" w="9525">
                     <a:solidFill>
                       <a:srgbClr val="000000"/>
                     </a:solidFill>
@@ -16274,7 +16274,7 @@
               </a:ln>
               <a:extLst>
                 <a:ext uri="{91240B29-F687-4f45-9708-019B960494DF}">
-                  <a14:hiddenLine xmlns:a14="http://schemas.microsoft.com/office/drawing/2010/main" xmlns="" w="9525">
+                  <a14:hiddenLine xmlns="" xmlns:a14="http://schemas.microsoft.com/office/drawing/2010/main" w="9525">
                     <a:solidFill>
                       <a:srgbClr val="000000"/>
                     </a:solidFill>
@@ -16336,7 +16336,7 @@
               </a:ln>
               <a:extLst>
                 <a:ext uri="{91240B29-F687-4f45-9708-019B960494DF}">
-                  <a14:hiddenLine xmlns:a14="http://schemas.microsoft.com/office/drawing/2010/main" xmlns="" w="9525">
+                  <a14:hiddenLine xmlns="" xmlns:a14="http://schemas.microsoft.com/office/drawing/2010/main" w="9525">
                     <a:solidFill>
                       <a:srgbClr val="000000"/>
                     </a:solidFill>
@@ -16426,7 +16426,7 @@
               </a:ln>
               <a:extLst>
                 <a:ext uri="{91240B29-F687-4f45-9708-019B960494DF}">
-                  <a14:hiddenLine xmlns:a14="http://schemas.microsoft.com/office/drawing/2010/main" xmlns="" w="9525">
+                  <a14:hiddenLine xmlns="" xmlns:a14="http://schemas.microsoft.com/office/drawing/2010/main" w="9525">
                     <a:solidFill>
                       <a:srgbClr val="000000"/>
                     </a:solidFill>
@@ -16460,7 +16460,7 @@
               </a:ln>
               <a:extLst>
                 <a:ext uri="{91240B29-F687-4f45-9708-019B960494DF}">
-                  <a14:hiddenLine xmlns:a14="http://schemas.microsoft.com/office/drawing/2010/main" xmlns="" w="9525">
+                  <a14:hiddenLine xmlns="" xmlns:a14="http://schemas.microsoft.com/office/drawing/2010/main" w="9525">
                     <a:solidFill>
                       <a:srgbClr val="000000"/>
                     </a:solidFill>
@@ -16525,7 +16525,7 @@
               </a:ln>
               <a:extLst>
                 <a:ext uri="{91240B29-F687-4f45-9708-019B960494DF}">
-                  <a14:hiddenLine xmlns:a14="http://schemas.microsoft.com/office/drawing/2010/main" xmlns="" w="9525">
+                  <a14:hiddenLine xmlns="" xmlns:a14="http://schemas.microsoft.com/office/drawing/2010/main" w="9525">
                     <a:solidFill>
                       <a:srgbClr val="000000"/>
                     </a:solidFill>
@@ -16615,7 +16615,7 @@
               </a:ln>
               <a:extLst>
                 <a:ext uri="{91240B29-F687-4f45-9708-019B960494DF}">
-                  <a14:hiddenLine xmlns:a14="http://schemas.microsoft.com/office/drawing/2010/main" xmlns="" w="9525">
+                  <a14:hiddenLine xmlns="" xmlns:a14="http://schemas.microsoft.com/office/drawing/2010/main" w="9525">
                     <a:solidFill>
                       <a:srgbClr val="000000"/>
                     </a:solidFill>
@@ -16677,7 +16677,7 @@
               </a:ln>
               <a:extLst>
                 <a:ext uri="{91240B29-F687-4f45-9708-019B960494DF}">
-                  <a14:hiddenLine xmlns:a14="http://schemas.microsoft.com/office/drawing/2010/main" xmlns="" w="9525">
+                  <a14:hiddenLine xmlns="" xmlns:a14="http://schemas.microsoft.com/office/drawing/2010/main" w="9525">
                     <a:solidFill>
                       <a:srgbClr val="000000"/>
                     </a:solidFill>
@@ -16767,7 +16767,7 @@
               </a:ln>
               <a:extLst>
                 <a:ext uri="{91240B29-F687-4f45-9708-019B960494DF}">
-                  <a14:hiddenLine xmlns:a14="http://schemas.microsoft.com/office/drawing/2010/main" xmlns="" w="9525">
+                  <a14:hiddenLine xmlns="" xmlns:a14="http://schemas.microsoft.com/office/drawing/2010/main" w="9525">
                     <a:solidFill>
                       <a:srgbClr val="000000"/>
                     </a:solidFill>
@@ -16832,7 +16832,7 @@
               </a:ln>
               <a:extLst>
                 <a:ext uri="{91240B29-F687-4f45-9708-019B960494DF}">
-                  <a14:hiddenLine xmlns:a14="http://schemas.microsoft.com/office/drawing/2010/main" xmlns="" w="9525">
+                  <a14:hiddenLine xmlns="" xmlns:a14="http://schemas.microsoft.com/office/drawing/2010/main" w="9525">
                     <a:solidFill>
                       <a:srgbClr val="000000"/>
                     </a:solidFill>
@@ -16894,7 +16894,7 @@
               </a:ln>
               <a:extLst>
                 <a:ext uri="{91240B29-F687-4f45-9708-019B960494DF}">
-                  <a14:hiddenLine xmlns:a14="http://schemas.microsoft.com/office/drawing/2010/main" xmlns="" w="9525">
+                  <a14:hiddenLine xmlns="" xmlns:a14="http://schemas.microsoft.com/office/drawing/2010/main" w="9525">
                     <a:solidFill>
                       <a:srgbClr val="000000"/>
                     </a:solidFill>
@@ -16984,7 +16984,7 @@
               </a:ln>
               <a:extLst>
                 <a:ext uri="{91240B29-F687-4f45-9708-019B960494DF}">
-                  <a14:hiddenLine xmlns:a14="http://schemas.microsoft.com/office/drawing/2010/main" xmlns="" w="9525">
+                  <a14:hiddenLine xmlns="" xmlns:a14="http://schemas.microsoft.com/office/drawing/2010/main" w="9525">
                     <a:solidFill>
                       <a:srgbClr val="000000"/>
                     </a:solidFill>
@@ -17074,7 +17074,7 @@
               </a:ln>
               <a:extLst>
                 <a:ext uri="{91240B29-F687-4f45-9708-019B960494DF}">
-                  <a14:hiddenLine xmlns:a14="http://schemas.microsoft.com/office/drawing/2010/main" xmlns="" w="9525">
+                  <a14:hiddenLine xmlns="" xmlns:a14="http://schemas.microsoft.com/office/drawing/2010/main" w="9525">
                     <a:solidFill>
                       <a:srgbClr val="000000"/>
                     </a:solidFill>
@@ -17139,7 +17139,7 @@
               </a:ln>
               <a:extLst>
                 <a:ext uri="{91240B29-F687-4f45-9708-019B960494DF}">
-                  <a14:hiddenLine xmlns:a14="http://schemas.microsoft.com/office/drawing/2010/main" xmlns="" w="9525">
+                  <a14:hiddenLine xmlns="" xmlns:a14="http://schemas.microsoft.com/office/drawing/2010/main" w="9525">
                     <a:solidFill>
                       <a:srgbClr val="000000"/>
                     </a:solidFill>
@@ -17259,7 +17259,7 @@
               </a:ln>
               <a:extLst>
                 <a:ext uri="{91240B29-F687-4f45-9708-019B960494DF}">
-                  <a14:hiddenLine xmlns:a14="http://schemas.microsoft.com/office/drawing/2010/main" xmlns="" w="9525">
+                  <a14:hiddenLine xmlns="" xmlns:a14="http://schemas.microsoft.com/office/drawing/2010/main" w="9525">
                     <a:solidFill>
                       <a:srgbClr val="000000"/>
                     </a:solidFill>
@@ -17340,7 +17340,7 @@
               </a:ln>
               <a:extLst>
                 <a:ext uri="{91240B29-F687-4f45-9708-019B960494DF}">
-                  <a14:hiddenLine xmlns:a14="http://schemas.microsoft.com/office/drawing/2010/main" xmlns="" w="9525">
+                  <a14:hiddenLine xmlns="" xmlns:a14="http://schemas.microsoft.com/office/drawing/2010/main" w="9525">
                     <a:solidFill>
                       <a:srgbClr val="000000"/>
                     </a:solidFill>
@@ -17455,7 +17455,7 @@
               </a:ln>
               <a:extLst>
                 <a:ext uri="{91240B29-F687-4f45-9708-019B960494DF}">
-                  <a14:hiddenLine xmlns:a14="http://schemas.microsoft.com/office/drawing/2010/main" xmlns="" w="9525">
+                  <a14:hiddenLine xmlns="" xmlns:a14="http://schemas.microsoft.com/office/drawing/2010/main" w="9525">
                     <a:solidFill>
                       <a:srgbClr val="000000"/>
                     </a:solidFill>
@@ -17545,7 +17545,7 @@
               </a:ln>
               <a:extLst>
                 <a:ext uri="{91240B29-F687-4f45-9708-019B960494DF}">
-                  <a14:hiddenLine xmlns:a14="http://schemas.microsoft.com/office/drawing/2010/main" xmlns="" w="9525">
+                  <a14:hiddenLine xmlns="" xmlns:a14="http://schemas.microsoft.com/office/drawing/2010/main" w="9525">
                     <a:solidFill>
                       <a:srgbClr val="000000"/>
                     </a:solidFill>
@@ -17610,7 +17610,7 @@
               </a:ln>
               <a:extLst>
                 <a:ext uri="{91240B29-F687-4f45-9708-019B960494DF}">
-                  <a14:hiddenLine xmlns:a14="http://schemas.microsoft.com/office/drawing/2010/main" xmlns="" w="9525">
+                  <a14:hiddenLine xmlns="" xmlns:a14="http://schemas.microsoft.com/office/drawing/2010/main" w="9525">
                     <a:solidFill>
                       <a:srgbClr val="000000"/>
                     </a:solidFill>
@@ -17700,7 +17700,7 @@
               </a:ln>
               <a:extLst>
                 <a:ext uri="{91240B29-F687-4f45-9708-019B960494DF}">
-                  <a14:hiddenLine xmlns:a14="http://schemas.microsoft.com/office/drawing/2010/main" xmlns="" w="9525">
+                  <a14:hiddenLine xmlns="" xmlns:a14="http://schemas.microsoft.com/office/drawing/2010/main" w="9525">
                     <a:solidFill>
                       <a:srgbClr val="000000"/>
                     </a:solidFill>
@@ -17768,7 +17768,7 @@
               </a:ln>
               <a:extLst>
                 <a:ext uri="{91240B29-F687-4f45-9708-019B960494DF}">
-                  <a14:hiddenLine xmlns:a14="http://schemas.microsoft.com/office/drawing/2010/main" xmlns="" w="9525">
+                  <a14:hiddenLine xmlns="" xmlns:a14="http://schemas.microsoft.com/office/drawing/2010/main" w="9525">
                     <a:solidFill>
                       <a:srgbClr val="000000"/>
                     </a:solidFill>
@@ -17858,7 +17858,7 @@
               </a:ln>
               <a:extLst>
                 <a:ext uri="{91240B29-F687-4f45-9708-019B960494DF}">
-                  <a14:hiddenLine xmlns:a14="http://schemas.microsoft.com/office/drawing/2010/main" xmlns="" w="9525">
+                  <a14:hiddenLine xmlns="" xmlns:a14="http://schemas.microsoft.com/office/drawing/2010/main" w="9525">
                     <a:solidFill>
                       <a:srgbClr val="000000"/>
                     </a:solidFill>
@@ -17926,7 +17926,7 @@
               </a:ln>
               <a:extLst>
                 <a:ext uri="{91240B29-F687-4f45-9708-019B960494DF}">
-                  <a14:hiddenLine xmlns:a14="http://schemas.microsoft.com/office/drawing/2010/main" xmlns="" w="9525">
+                  <a14:hiddenLine xmlns="" xmlns:a14="http://schemas.microsoft.com/office/drawing/2010/main" w="9525">
                     <a:solidFill>
                       <a:srgbClr val="000000"/>
                     </a:solidFill>
@@ -18016,7 +18016,7 @@
               </a:ln>
               <a:extLst>
                 <a:ext uri="{91240B29-F687-4f45-9708-019B960494DF}">
-                  <a14:hiddenLine xmlns:a14="http://schemas.microsoft.com/office/drawing/2010/main" xmlns="" w="9525">
+                  <a14:hiddenLine xmlns="" xmlns:a14="http://schemas.microsoft.com/office/drawing/2010/main" w="9525">
                     <a:solidFill>
                       <a:srgbClr val="000000"/>
                     </a:solidFill>
@@ -18050,7 +18050,7 @@
               </a:ln>
               <a:extLst>
                 <a:ext uri="{91240B29-F687-4f45-9708-019B960494DF}">
-                  <a14:hiddenLine xmlns:a14="http://schemas.microsoft.com/office/drawing/2010/main" xmlns="" w="9525">
+                  <a14:hiddenLine xmlns="" xmlns:a14="http://schemas.microsoft.com/office/drawing/2010/main" w="9525">
                     <a:solidFill>
                       <a:srgbClr val="000000"/>
                     </a:solidFill>
@@ -20874,10 +20874,40 @@
             <a:endParaRPr lang="en-US" dirty="0" smtClean="0"/>
           </a:p>
           <a:p>
+            <a:pPr marL="0" indent="0">
+              <a:buNone/>
+            </a:pPr>
+            <a:endParaRPr lang="en-US" dirty="0" smtClean="0"/>
+          </a:p>
+          <a:p>
             <a:endParaRPr lang="en-US" dirty="0"/>
           </a:p>
         </p:txBody>
       </p:sp>
+      <p:pic>
+        <p:nvPicPr>
+          <p:cNvPr id="4" name="Picture 3"/>
+          <p:cNvPicPr>
+            <a:picLocks noChangeAspect="1"/>
+          </p:cNvPicPr>
+          <p:nvPr/>
+        </p:nvPicPr>
+        <p:blipFill>
+          <a:blip r:embed="rId7"/>
+          <a:stretch>
+            <a:fillRect/>
+          </a:stretch>
+        </p:blipFill>
+        <p:spPr>
+          <a:xfrm>
+            <a:off x="8103459" y="4354490"/>
+            <a:ext cx="1564517" cy="1575881"/>
+          </a:xfrm>
+          <a:prstGeom prst="rect">
+            <a:avLst/>
+          </a:prstGeom>
+        </p:spPr>
+      </p:pic>
     </p:spTree>
     <p:extLst>
       <p:ext uri="{BB962C8B-B14F-4D97-AF65-F5344CB8AC3E}">

</xml_diff>